<commit_message>
update parts Pierre slides
</commit_message>
<xml_diff>
--- a/pres_soutenance_v4.pptx
+++ b/pres_soutenance_v4.pptx
@@ -229,7 +229,7 @@
           <a:p>
             <a:fld id="{8D80F073-C889-4F11-9408-744CDA7946D2}" type="datetimeFigureOut">
               <a:rPr lang="en-GB" smtClean="0"/>
-              <a:t>01/02/2022</a:t>
+              <a:t>02/02/2022</a:t>
             </a:fld>
             <a:endParaRPr lang="en-GB"/>
           </a:p>
@@ -2338,7 +2338,7 @@
           <a:p>
             <a:fld id="{48D70FE8-65FD-4950-BD19-4EE3A454551B}" type="datetimeFigureOut">
               <a:rPr lang="en-GB" smtClean="0"/>
-              <a:t>01/02/2022</a:t>
+              <a:t>02/02/2022</a:t>
             </a:fld>
             <a:endParaRPr lang="en-GB"/>
           </a:p>
@@ -2538,7 +2538,7 @@
           <a:p>
             <a:fld id="{48D70FE8-65FD-4950-BD19-4EE3A454551B}" type="datetimeFigureOut">
               <a:rPr lang="en-GB" smtClean="0"/>
-              <a:t>01/02/2022</a:t>
+              <a:t>02/02/2022</a:t>
             </a:fld>
             <a:endParaRPr lang="en-GB"/>
           </a:p>
@@ -2748,7 +2748,7 @@
           <a:p>
             <a:fld id="{48D70FE8-65FD-4950-BD19-4EE3A454551B}" type="datetimeFigureOut">
               <a:rPr lang="en-GB" smtClean="0"/>
-              <a:t>01/02/2022</a:t>
+              <a:t>02/02/2022</a:t>
             </a:fld>
             <a:endParaRPr lang="en-GB"/>
           </a:p>
@@ -2948,7 +2948,7 @@
           <a:p>
             <a:fld id="{48D70FE8-65FD-4950-BD19-4EE3A454551B}" type="datetimeFigureOut">
               <a:rPr lang="en-GB" smtClean="0"/>
-              <a:t>01/02/2022</a:t>
+              <a:t>02/02/2022</a:t>
             </a:fld>
             <a:endParaRPr lang="en-GB"/>
           </a:p>
@@ -3224,7 +3224,7 @@
           <a:p>
             <a:fld id="{48D70FE8-65FD-4950-BD19-4EE3A454551B}" type="datetimeFigureOut">
               <a:rPr lang="en-GB" smtClean="0"/>
-              <a:t>01/02/2022</a:t>
+              <a:t>02/02/2022</a:t>
             </a:fld>
             <a:endParaRPr lang="en-GB"/>
           </a:p>
@@ -3492,7 +3492,7 @@
           <a:p>
             <a:fld id="{48D70FE8-65FD-4950-BD19-4EE3A454551B}" type="datetimeFigureOut">
               <a:rPr lang="en-GB" smtClean="0"/>
-              <a:t>01/02/2022</a:t>
+              <a:t>02/02/2022</a:t>
             </a:fld>
             <a:endParaRPr lang="en-GB"/>
           </a:p>
@@ -3907,7 +3907,7 @@
           <a:p>
             <a:fld id="{48D70FE8-65FD-4950-BD19-4EE3A454551B}" type="datetimeFigureOut">
               <a:rPr lang="en-GB" smtClean="0"/>
-              <a:t>01/02/2022</a:t>
+              <a:t>02/02/2022</a:t>
             </a:fld>
             <a:endParaRPr lang="en-GB"/>
           </a:p>
@@ -4049,7 +4049,7 @@
           <a:p>
             <a:fld id="{48D70FE8-65FD-4950-BD19-4EE3A454551B}" type="datetimeFigureOut">
               <a:rPr lang="en-GB" smtClean="0"/>
-              <a:t>01/02/2022</a:t>
+              <a:t>02/02/2022</a:t>
             </a:fld>
             <a:endParaRPr lang="en-GB"/>
           </a:p>
@@ -4162,7 +4162,7 @@
           <a:p>
             <a:fld id="{48D70FE8-65FD-4950-BD19-4EE3A454551B}" type="datetimeFigureOut">
               <a:rPr lang="en-GB" smtClean="0"/>
-              <a:t>01/02/2022</a:t>
+              <a:t>02/02/2022</a:t>
             </a:fld>
             <a:endParaRPr lang="en-GB"/>
           </a:p>
@@ -4475,7 +4475,7 @@
           <a:p>
             <a:fld id="{48D70FE8-65FD-4950-BD19-4EE3A454551B}" type="datetimeFigureOut">
               <a:rPr lang="en-GB" smtClean="0"/>
-              <a:t>01/02/2022</a:t>
+              <a:t>02/02/2022</a:t>
             </a:fld>
             <a:endParaRPr lang="en-GB"/>
           </a:p>
@@ -4764,7 +4764,7 @@
           <a:p>
             <a:fld id="{48D70FE8-65FD-4950-BD19-4EE3A454551B}" type="datetimeFigureOut">
               <a:rPr lang="en-GB" smtClean="0"/>
-              <a:t>01/02/2022</a:t>
+              <a:t>02/02/2022</a:t>
             </a:fld>
             <a:endParaRPr lang="en-GB"/>
           </a:p>
@@ -5007,7 +5007,7 @@
           <a:p>
             <a:fld id="{48D70FE8-65FD-4950-BD19-4EE3A454551B}" type="datetimeFigureOut">
               <a:rPr lang="en-GB" smtClean="0"/>
-              <a:t>01/02/2022</a:t>
+              <a:t>02/02/2022</a:t>
             </a:fld>
             <a:endParaRPr lang="en-GB"/>
           </a:p>
@@ -5589,7 +5589,7 @@
               <a:rPr lang="fr-FR" sz="2000" b="1" smtClean="0">
                 <a:latin typeface="+mj-lt"/>
               </a:rPr>
-              <a:t>1er février 2022</a:t>
+              <a:t>2 février 2022</a:t>
             </a:fld>
             <a:endParaRPr lang="en-GB" sz="2000" b="1" dirty="0">
               <a:latin typeface="+mj-lt"/>
@@ -5678,15 +5678,20 @@
           <p:nvPr/>
         </p:nvPicPr>
         <p:blipFill>
-          <a:blip r:embed="rId3"/>
-          <a:stretch>
-            <a:fillRect/>
-          </a:stretch>
+          <a:blip r:embed="rId3">
+            <a:extLst>
+              <a:ext uri="{28A0092B-C50C-407E-A947-70E740481C1C}">
+                <a14:useLocalDpi xmlns:a14="http://schemas.microsoft.com/office/drawing/2010/main" val="0"/>
+              </a:ext>
+            </a:extLst>
+          </a:blip>
+          <a:srcRect/>
+          <a:stretch/>
         </p:blipFill>
         <p:spPr>
           <a:xfrm>
-            <a:off x="5861844" y="3873481"/>
-            <a:ext cx="5799930" cy="2127151"/>
+            <a:off x="5861844" y="3886344"/>
+            <a:ext cx="5799930" cy="2101424"/>
           </a:xfrm>
           <a:prstGeom prst="rect">
             <a:avLst/>
@@ -5867,7 +5872,7 @@
                   <a:rPr lang="fr-FR" sz="1200" b="1" smtClean="0">
                     <a:latin typeface="+mj-lt"/>
                   </a:rPr>
-                  <a:t>01/02/2022</a:t>
+                  <a:t>02/02/2022</a:t>
                 </a:fld>
                 <a:endParaRPr lang="en-GB" sz="1400" b="1" cap="small" dirty="0">
                   <a:latin typeface="+mj-lt"/>
@@ -6342,7 +6347,7 @@
               <a:rPr lang="fr-FR" dirty="0">
                 <a:solidFill>
                   <a:schemeClr val="accent6">
-                    <a:lumMod val="50000"/>
+                    <a:lumMod val="75000"/>
                   </a:schemeClr>
                 </a:solidFill>
               </a:rPr>
@@ -6540,11 +6545,21 @@
               <a:rPr lang="fr-FR" dirty="0">
                 <a:solidFill>
                   <a:schemeClr val="accent6">
+                    <a:lumMod val="75000"/>
+                  </a:schemeClr>
+                </a:solidFill>
+              </a:rPr>
+              <a:t>hebdomadaire</a:t>
+            </a:r>
+            <a:r>
+              <a:rPr lang="fr-FR" dirty="0">
+                <a:solidFill>
+                  <a:schemeClr val="accent6">
                     <a:lumMod val="50000"/>
                   </a:schemeClr>
                 </a:solidFill>
               </a:rPr>
-              <a:t>hebdomadaire </a:t>
+              <a:t> </a:t>
             </a:r>
           </a:p>
           <a:p>
@@ -6771,7 +6786,7 @@
                   <a:rPr lang="fr-FR" sz="1200" b="1" smtClean="0">
                     <a:latin typeface="+mj-lt"/>
                   </a:rPr>
-                  <a:t>01/02/2022</a:t>
+                  <a:t>02/02/2022</a:t>
                 </a:fld>
                 <a:endParaRPr lang="en-GB" sz="1400" b="1" cap="small" dirty="0">
                   <a:latin typeface="+mj-lt"/>
@@ -7793,7 +7808,7 @@
                   <a:rPr lang="fr-FR" sz="1200" b="1" smtClean="0">
                     <a:latin typeface="+mj-lt"/>
                   </a:rPr>
-                  <a:t>01/02/2022</a:t>
+                  <a:t>02/02/2022</a:t>
                 </a:fld>
                 <a:endParaRPr lang="en-GB" sz="1400" b="1" cap="small" dirty="0">
                   <a:latin typeface="+mj-lt"/>
@@ -11519,7 +11534,7 @@
                   <a:rPr lang="fr-FR" sz="1200" b="1" smtClean="0">
                     <a:latin typeface="+mj-lt"/>
                   </a:rPr>
-                  <a:t>01/02/2022</a:t>
+                  <a:t>02/02/2022</a:t>
                 </a:fld>
                 <a:endParaRPr lang="en-GB" sz="1400" b="1" cap="small" dirty="0">
                   <a:latin typeface="+mj-lt"/>
@@ -12620,7 +12635,7 @@
         <p:spPr>
           <a:xfrm>
             <a:off x="858624" y="1380778"/>
-            <a:ext cx="5724580" cy="2126864"/>
+            <a:ext cx="9693231" cy="3373359"/>
           </a:xfrm>
           <a:prstGeom prst="rect">
             <a:avLst/>
@@ -12651,6 +12666,111 @@
               <a:defRPr/>
             </a:pPr>
             <a:r>
+              <a:rPr lang="fr-FR" dirty="0">
+                <a:solidFill>
+                  <a:prstClr val="black"/>
+                </a:solidFill>
+                <a:latin typeface="Calibri" panose="020F0502020204030204"/>
+              </a:rPr>
+              <a:t>Modélisation plus proche des trajectoires réelles des Puffins de Scopoli</a:t>
+            </a:r>
+          </a:p>
+          <a:p>
+            <a:pPr marL="742950" lvl="1" indent="-285750">
+              <a:lnSpc>
+                <a:spcPct val="150000"/>
+              </a:lnSpc>
+              <a:buFont typeface="Calibri" panose="020F0502020204030204" pitchFamily="34" charset="0"/>
+              <a:buChar char="-"/>
+              <a:defRPr/>
+            </a:pPr>
+            <a:r>
+              <a:rPr kumimoji="0" lang="fr-FR" b="0" i="0" u="none" strike="noStrike" kern="1200" cap="none" spc="0" normalizeH="0" baseline="0" noProof="0" dirty="0">
+                <a:ln>
+                  <a:noFill/>
+                </a:ln>
+                <a:solidFill>
+                  <a:prstClr val="black"/>
+                </a:solidFill>
+                <a:effectLst/>
+                <a:uLnTx/>
+                <a:uFillTx/>
+                <a:latin typeface="Calibri" panose="020F0502020204030204"/>
+                <a:ea typeface="+mn-ea"/>
+                <a:cs typeface="+mn-cs"/>
+              </a:rPr>
+              <a:t>prise en compte des </a:t>
+            </a:r>
+            <a:r>
+              <a:rPr lang="fr-FR" dirty="0">
+                <a:solidFill>
+                  <a:prstClr val="black"/>
+                </a:solidFill>
+                <a:latin typeface="Calibri" panose="020F0502020204030204"/>
+              </a:rPr>
+              <a:t>caractéristiques de pas à conditionnellement à chaque position courante</a:t>
+            </a:r>
+          </a:p>
+          <a:p>
+            <a:pPr marL="742950" lvl="1" indent="-285750">
+              <a:lnSpc>
+                <a:spcPct val="150000"/>
+              </a:lnSpc>
+              <a:buFont typeface="Calibri" panose="020F0502020204030204" pitchFamily="34" charset="0"/>
+              <a:buChar char="-"/>
+              <a:defRPr/>
+            </a:pPr>
+            <a:endParaRPr lang="fr-FR" dirty="0">
+              <a:solidFill>
+                <a:prstClr val="black"/>
+              </a:solidFill>
+              <a:latin typeface="Calibri" panose="020F0502020204030204"/>
+            </a:endParaRPr>
+          </a:p>
+          <a:p>
+            <a:pPr marL="285750" marR="0" lvl="0" indent="-285750" algn="l" defTabSz="914400" rtl="0" eaLnBrk="1" fontAlgn="auto" latinLnBrk="0" hangingPunct="1">
+              <a:lnSpc>
+                <a:spcPct val="150000"/>
+              </a:lnSpc>
+              <a:spcBef>
+                <a:spcPts val="0"/>
+              </a:spcBef>
+              <a:spcAft>
+                <a:spcPts val="0"/>
+              </a:spcAft>
+              <a:buClrTx/>
+              <a:buSzTx/>
+              <a:buFont typeface="Arial" panose="020B0604020202020204" pitchFamily="34" charset="0"/>
+              <a:buChar char="•"/>
+              <a:tabLst/>
+              <a:defRPr/>
+            </a:pPr>
+            <a:endParaRPr lang="fr-FR" dirty="0">
+              <a:solidFill>
+                <a:prstClr val="black"/>
+              </a:solidFill>
+              <a:latin typeface="Calibri" panose="020F0502020204030204"/>
+            </a:endParaRPr>
+          </a:p>
+          <a:p>
+            <a:pPr marL="285750" marR="0" lvl="0" indent="-285750" algn="l" defTabSz="914400" rtl="0" eaLnBrk="1" fontAlgn="auto" latinLnBrk="0" hangingPunct="1">
+              <a:lnSpc>
+                <a:spcPct val="150000"/>
+              </a:lnSpc>
+              <a:spcBef>
+                <a:spcPts val="0"/>
+              </a:spcBef>
+              <a:spcAft>
+                <a:spcPts val="0"/>
+              </a:spcAft>
+              <a:buClrTx/>
+              <a:buSzTx/>
+              <a:buFont typeface="Arial" panose="020B0604020202020204" pitchFamily="34" charset="0"/>
+              <a:buChar char="•"/>
+              <a:tabLst/>
+              <a:defRPr/>
+            </a:pPr>
+            <a:r>
               <a:rPr kumimoji="0" lang="fr-FR" sz="1800" b="0" i="0" u="none" strike="noStrike" kern="1200" cap="none" spc="0" normalizeH="0" baseline="0" noProof="0" dirty="0">
                 <a:ln>
                   <a:noFill/>
@@ -12665,7 +12785,7 @@
                 <a:ea typeface="+mn-ea"/>
                 <a:cs typeface="+mn-cs"/>
               </a:rPr>
-              <a:t>Instabilité des résultats selon les colonies :</a:t>
+              <a:t>Instabilité des résultats entre les colonies :</a:t>
             </a:r>
           </a:p>
           <a:p>
@@ -12728,16 +12848,7 @@
                 <a:ea typeface="+mn-ea"/>
                 <a:cs typeface="+mn-cs"/>
               </a:rPr>
-              <a:t>comp</a:t>
-            </a:r>
-            <a:r>
-              <a:rPr lang="fr-FR" dirty="0" err="1">
-                <a:solidFill>
-                  <a:prstClr val="black"/>
-                </a:solidFill>
-                <a:latin typeface="Calibri" panose="020F0502020204030204"/>
-              </a:rPr>
-              <a:t>ortements</a:t>
+              <a:t>comportement</a:t>
             </a:r>
             <a:r>
               <a:rPr lang="fr-FR" dirty="0">
@@ -12746,7 +12857,7 @@
                 </a:solidFill>
                 <a:latin typeface="Calibri" panose="020F0502020204030204"/>
               </a:rPr>
-              <a:t> de déplacement</a:t>
+              <a:t>s de déplacement</a:t>
             </a:r>
           </a:p>
           <a:p>
@@ -12772,42 +12883,6 @@
               <a:ea typeface="+mn-ea"/>
               <a:cs typeface="+mn-cs"/>
             </a:endParaRPr>
-          </a:p>
-          <a:p>
-            <a:pPr marL="285750" marR="0" lvl="0" indent="-285750" algn="l" defTabSz="914400" rtl="0" eaLnBrk="1" fontAlgn="auto" latinLnBrk="0" hangingPunct="1">
-              <a:lnSpc>
-                <a:spcPct val="150000"/>
-              </a:lnSpc>
-              <a:spcBef>
-                <a:spcPts val="0"/>
-              </a:spcBef>
-              <a:spcAft>
-                <a:spcPts val="0"/>
-              </a:spcAft>
-              <a:buClrTx/>
-              <a:buSzTx/>
-              <a:buFont typeface="Arial" panose="020B0604020202020204" pitchFamily="34" charset="0"/>
-              <a:buChar char="•"/>
-              <a:tabLst/>
-              <a:defRPr/>
-            </a:pPr>
-            <a:r>
-              <a:rPr kumimoji="0" lang="fr-FR" sz="1800" b="0" i="0" u="none" strike="noStrike" kern="1200" cap="none" spc="0" normalizeH="0" baseline="0" noProof="0" dirty="0">
-                <a:ln>
-                  <a:noFill/>
-                </a:ln>
-                <a:solidFill>
-                  <a:prstClr val="black"/>
-                </a:solidFill>
-                <a:effectLst/>
-                <a:uLnTx/>
-                <a:uFillTx/>
-                <a:latin typeface="Calibri" panose="020F0502020204030204"/>
-                <a:ea typeface="+mn-ea"/>
-                <a:cs typeface="+mn-cs"/>
-              </a:rPr>
-              <a:t>[faire le lien avec les résultats de Clara P. et Matthieu A.]</a:t>
-            </a:r>
           </a:p>
         </p:txBody>
       </p:sp>
@@ -13464,7 +13539,7 @@
                 </a:solidFill>
                 <a:latin typeface="Calibri" panose="020F0502020204030204"/>
               </a:rPr>
-              <a:t>?</a:t>
+              <a:t>…</a:t>
             </a:r>
             <a:r>
               <a:rPr lang="fr-FR" dirty="0">
@@ -13725,7 +13800,7 @@
         <p:spPr>
           <a:xfrm>
             <a:off x="331514" y="368212"/>
-            <a:ext cx="1519968" cy="523220"/>
+            <a:ext cx="2547492" cy="523220"/>
           </a:xfrm>
           <a:prstGeom prst="rect">
             <a:avLst/>
@@ -13742,7 +13817,7 @@
               <a:rPr lang="fr-FR" sz="2800" b="1" cap="small" dirty="0">
                 <a:latin typeface="+mj-lt"/>
               </a:rPr>
-              <a:t>Sommaire</a:t>
+              <a:t>Le déroulement…</a:t>
             </a:r>
             <a:endParaRPr lang="en-GB" sz="2800" b="1" cap="small" dirty="0">
               <a:latin typeface="+mj-lt"/>
@@ -13924,7 +13999,7 @@
                   <a:rPr lang="fr-FR" sz="1200" b="1" smtClean="0">
                     <a:latin typeface="+mj-lt"/>
                   </a:rPr>
-                  <a:t>01/02/2022</a:t>
+                  <a:t>02/02/2022</a:t>
                 </a:fld>
                 <a:endParaRPr lang="en-GB" sz="1400" b="1" cap="small" dirty="0">
                   <a:latin typeface="+mj-lt"/>
@@ -14293,7 +14368,7 @@
                   <a:rPr lang="fr-FR" sz="1200" b="1" smtClean="0">
                     <a:latin typeface="+mj-lt"/>
                   </a:rPr>
-                  <a:t>01/02/2022</a:t>
+                  <a:t>02/02/2022</a:t>
                 </a:fld>
                 <a:endParaRPr lang="en-GB" sz="1400" b="1" cap="small" dirty="0">
                   <a:latin typeface="+mj-lt"/>
@@ -15201,7 +15276,7 @@
               <a:rPr lang="fr-FR" sz="2000" b="1" smtClean="0">
                 <a:latin typeface="+mj-lt"/>
               </a:rPr>
-              <a:t>1er février 2022</a:t>
+              <a:t>2 février 2022</a:t>
             </a:fld>
             <a:endParaRPr lang="en-GB" sz="2000" b="1" dirty="0">
               <a:latin typeface="+mj-lt"/>
@@ -16177,7 +16252,7 @@
                   <a:rPr lang="fr-FR" sz="1200" b="1" smtClean="0">
                     <a:latin typeface="+mj-lt"/>
                   </a:rPr>
-                  <a:t>01/02/2022</a:t>
+                  <a:t>02/02/2022</a:t>
                 </a:fld>
                 <a:endParaRPr lang="en-GB" sz="1400" b="1" cap="small" dirty="0">
                   <a:latin typeface="+mj-lt"/>
@@ -16599,7 +16674,7 @@
                   <a:rPr lang="fr-FR" sz="1200" b="1" smtClean="0">
                     <a:latin typeface="+mj-lt"/>
                   </a:rPr>
-                  <a:t>01/02/2022</a:t>
+                  <a:t>02/02/2022</a:t>
                 </a:fld>
                 <a:endParaRPr lang="en-GB" sz="1400" b="1" cap="small" dirty="0">
                   <a:latin typeface="+mj-lt"/>
@@ -17387,7 +17462,7 @@
                   <a:rPr lang="fr-FR" sz="1200" b="1" smtClean="0">
                     <a:latin typeface="+mj-lt"/>
                   </a:rPr>
-                  <a:t>01/02/2022</a:t>
+                  <a:t>02/02/2022</a:t>
                 </a:fld>
                 <a:endParaRPr lang="en-GB" sz="1400" b="1" cap="small" dirty="0">
                   <a:latin typeface="+mj-lt"/>
@@ -18192,7 +18267,7 @@
                   <a:rPr lang="fr-FR" sz="1200" b="1" smtClean="0">
                     <a:latin typeface="+mj-lt"/>
                   </a:rPr>
-                  <a:t>01/02/2022</a:t>
+                  <a:t>02/02/2022</a:t>
                 </a:fld>
                 <a:endParaRPr lang="en-GB" sz="1400" b="1" cap="small" dirty="0">
                   <a:latin typeface="+mj-lt"/>
@@ -19026,7 +19101,7 @@
                   <a:rPr lang="fr-FR" sz="1200" b="1" smtClean="0">
                     <a:latin typeface="+mj-lt"/>
                   </a:rPr>
-                  <a:t>01/02/2022</a:t>
+                  <a:t>02/02/2022</a:t>
                 </a:fld>
                 <a:endParaRPr lang="en-GB" sz="1400" b="1" cap="small" dirty="0">
                   <a:latin typeface="+mj-lt"/>
@@ -19753,7 +19828,7 @@
                   <a:rPr lang="fr-FR" sz="1200" b="1" smtClean="0">
                     <a:latin typeface="+mj-lt"/>
                   </a:rPr>
-                  <a:t>01/02/2022</a:t>
+                  <a:t>02/02/2022</a:t>
                 </a:fld>
                 <a:endParaRPr lang="en-GB" sz="1400" b="1" cap="small" dirty="0">
                   <a:latin typeface="+mj-lt"/>
@@ -20552,7 +20627,7 @@
                   <a:rPr lang="fr-FR" sz="1200" b="1" smtClean="0">
                     <a:latin typeface="+mj-lt"/>
                   </a:rPr>
-                  <a:t>01/02/2022</a:t>
+                  <a:t>02/02/2022</a:t>
                 </a:fld>
                 <a:endParaRPr lang="en-GB" sz="1400" b="1" cap="small" dirty="0">
                   <a:latin typeface="+mj-lt"/>

</xml_diff>